<commit_message>
Update 2.7 and 2.8 Price Comparison Documentation.pptx
</commit_message>
<xml_diff>
--- a/2.7 and 2.8 Price Comparison Documentation.pptx
+++ b/2.7 and 2.8 Price Comparison Documentation.pptx
@@ -126,12 +126,20 @@
 </p:presentation>
 </file>
 
+<file path=ppt/revisionInfo.xml><?xml version="1.0" encoding="utf-8"?>
+<p1510:revInfo xmlns:a="http://schemas.openxmlformats.org/drawingml/2006/main" xmlns:r="http://schemas.openxmlformats.org/officeDocument/2006/relationships" xmlns:p1510="http://schemas.microsoft.com/office/powerpoint/2015/10/main">
+  <p1510:revLst>
+    <p1510:client id="{A97A8591-A6B9-C94A-9734-B98EAB3B1160}" v="2" dt="2022-05-03T02:00:06.412"/>
+  </p1510:revLst>
+</p1510:revInfo>
+</file>
+
 <file path=ppt/changesInfos/changesInfo1.xml><?xml version="1.0" encoding="utf-8"?>
 <pc:chgInfo xmlns:a="http://schemas.openxmlformats.org/drawingml/2006/main" xmlns:r="http://schemas.openxmlformats.org/officeDocument/2006/relationships" xmlns:ac="http://schemas.microsoft.com/office/drawing/2013/main/command" xmlns:pc="http://schemas.microsoft.com/office/powerpoint/2013/main/command">
   <pc:docChgLst>
     <pc:chgData name="Joseph Wong" userId="37c40c65-e748-44d7-98f6-a28174b197b2" providerId="ADAL" clId="{A97A8591-A6B9-C94A-9734-B98EAB3B1160}"/>
     <pc:docChg chg="modSld">
-      <pc:chgData name="Joseph Wong" userId="37c40c65-e748-44d7-98f6-a28174b197b2" providerId="ADAL" clId="{A97A8591-A6B9-C94A-9734-B98EAB3B1160}" dt="2022-05-03T01:59:43.278" v="39" actId="20577"/>
+      <pc:chgData name="Joseph Wong" userId="37c40c65-e748-44d7-98f6-a28174b197b2" providerId="ADAL" clId="{A97A8591-A6B9-C94A-9734-B98EAB3B1160}" dt="2022-05-03T02:00:17.982" v="43" actId="14100"/>
       <pc:docMkLst>
         <pc:docMk/>
       </pc:docMkLst>
@@ -151,7 +159,7 @@
         </pc:spChg>
       </pc:sldChg>
       <pc:sldChg chg="modSp mod">
-        <pc:chgData name="Joseph Wong" userId="37c40c65-e748-44d7-98f6-a28174b197b2" providerId="ADAL" clId="{A97A8591-A6B9-C94A-9734-B98EAB3B1160}" dt="2022-05-03T01:59:43.278" v="39" actId="20577"/>
+        <pc:chgData name="Joseph Wong" userId="37c40c65-e748-44d7-98f6-a28174b197b2" providerId="ADAL" clId="{A97A8591-A6B9-C94A-9734-B98EAB3B1160}" dt="2022-05-03T02:00:17.982" v="43" actId="14100"/>
         <pc:sldMkLst>
           <pc:docMk/>
           <pc:sldMk cId="3838895173" sldId="258"/>
@@ -165,7 +173,7 @@
           </ac:spMkLst>
         </pc:spChg>
         <pc:spChg chg="mod">
-          <ac:chgData name="Joseph Wong" userId="37c40c65-e748-44d7-98f6-a28174b197b2" providerId="ADAL" clId="{A97A8591-A6B9-C94A-9734-B98EAB3B1160}" dt="2022-05-03T01:59:43.278" v="39" actId="20577"/>
+          <ac:chgData name="Joseph Wong" userId="37c40c65-e748-44d7-98f6-a28174b197b2" providerId="ADAL" clId="{A97A8591-A6B9-C94A-9734-B98EAB3B1160}" dt="2022-05-03T02:00:17.982" v="43" actId="14100"/>
           <ac:spMkLst>
             <pc:docMk/>
             <pc:sldMk cId="3838895173" sldId="258"/>
@@ -5773,8 +5781,8 @@
         </p:nvSpPr>
         <p:spPr>
           <a:xfrm>
-            <a:off x="1693460" y="1914475"/>
-            <a:ext cx="8520600" cy="1750800"/>
+            <a:off x="1693459" y="1914475"/>
+            <a:ext cx="10226397" cy="2216654"/>
           </a:xfrm>
           <a:prstGeom prst="rect">
             <a:avLst/>
@@ -6025,8 +6033,22 @@
                   <a:srgbClr val="274E13"/>
                 </a:solidFill>
               </a:rPr>
-              <a:t>Links to Trello board / project management tools: [here]</a:t>
-            </a:r>
+              <a:t>Links to Trello board / project management tools: </a:t>
+            </a:r>
+            <a:r>
+              <a:rPr lang="en-NZ" sz="2000" b="1" dirty="0">
+                <a:solidFill>
+                  <a:srgbClr val="274E13"/>
+                </a:solidFill>
+                <a:hlinkClick r:id="rId2"/>
+              </a:rPr>
+              <a:t>https://trello.com/b/FUjuD3L4/27-28-price-comparison-assessment</a:t>
+            </a:r>
+            <a:endParaRPr lang="en-NZ" sz="2000" b="1" dirty="0">
+              <a:solidFill>
+                <a:srgbClr val="274E13"/>
+              </a:solidFill>
+            </a:endParaRPr>
           </a:p>
           <a:p>
             <a:pPr marL="0" indent="0">

</xml_diff>